<commit_message>
Clean up of git content
</commit_message>
<xml_diff>
--- a/Documentation/Synthesizer 1 - Components.pptx
+++ b/Documentation/Synthesizer 1 - Components.pptx
@@ -104,6 +104,11 @@
       </a:defRPr>
     </a:lvl9pPr>
   </p:defaultTextStyle>
+  <p:extLst>
+    <p:ext uri="{EFAFB233-063F-42B5-8137-9DF3F51BA10A}">
+      <p15:sldGuideLst xmlns:p15="http://schemas.microsoft.com/office/powerpoint/2012/main"/>
+    </p:ext>
+  </p:extLst>
 </p:presentation>
 </file>
 
@@ -254,7 +259,7 @@
           <a:p>
             <a:fld id="{E9BFB732-892F-4075-8F06-FD9E514BB2D2}" type="datetimeFigureOut">
               <a:rPr lang="en-US" smtClean="0"/>
-              <a:t>7/19/2022</a:t>
+              <a:t>7/28/2022</a:t>
             </a:fld>
             <a:endParaRPr lang="en-US"/>
           </a:p>
@@ -452,7 +457,7 @@
           <a:p>
             <a:fld id="{E9BFB732-892F-4075-8F06-FD9E514BB2D2}" type="datetimeFigureOut">
               <a:rPr lang="en-US" smtClean="0"/>
-              <a:t>7/19/2022</a:t>
+              <a:t>7/28/2022</a:t>
             </a:fld>
             <a:endParaRPr lang="en-US"/>
           </a:p>
@@ -660,7 +665,7 @@
           <a:p>
             <a:fld id="{E9BFB732-892F-4075-8F06-FD9E514BB2D2}" type="datetimeFigureOut">
               <a:rPr lang="en-US" smtClean="0"/>
-              <a:t>7/19/2022</a:t>
+              <a:t>7/28/2022</a:t>
             </a:fld>
             <a:endParaRPr lang="en-US"/>
           </a:p>
@@ -858,7 +863,7 @@
           <a:p>
             <a:fld id="{E9BFB732-892F-4075-8F06-FD9E514BB2D2}" type="datetimeFigureOut">
               <a:rPr lang="en-US" smtClean="0"/>
-              <a:t>7/19/2022</a:t>
+              <a:t>7/28/2022</a:t>
             </a:fld>
             <a:endParaRPr lang="en-US"/>
           </a:p>
@@ -1133,7 +1138,7 @@
           <a:p>
             <a:fld id="{E9BFB732-892F-4075-8F06-FD9E514BB2D2}" type="datetimeFigureOut">
               <a:rPr lang="en-US" smtClean="0"/>
-              <a:t>7/19/2022</a:t>
+              <a:t>7/28/2022</a:t>
             </a:fld>
             <a:endParaRPr lang="en-US"/>
           </a:p>
@@ -1398,7 +1403,7 @@
           <a:p>
             <a:fld id="{E9BFB732-892F-4075-8F06-FD9E514BB2D2}" type="datetimeFigureOut">
               <a:rPr lang="en-US" smtClean="0"/>
-              <a:t>7/19/2022</a:t>
+              <a:t>7/28/2022</a:t>
             </a:fld>
             <a:endParaRPr lang="en-US"/>
           </a:p>
@@ -1810,7 +1815,7 @@
           <a:p>
             <a:fld id="{E9BFB732-892F-4075-8F06-FD9E514BB2D2}" type="datetimeFigureOut">
               <a:rPr lang="en-US" smtClean="0"/>
-              <a:t>7/19/2022</a:t>
+              <a:t>7/28/2022</a:t>
             </a:fld>
             <a:endParaRPr lang="en-US"/>
           </a:p>
@@ -1951,7 +1956,7 @@
           <a:p>
             <a:fld id="{E9BFB732-892F-4075-8F06-FD9E514BB2D2}" type="datetimeFigureOut">
               <a:rPr lang="en-US" smtClean="0"/>
-              <a:t>7/19/2022</a:t>
+              <a:t>7/28/2022</a:t>
             </a:fld>
             <a:endParaRPr lang="en-US"/>
           </a:p>
@@ -2064,7 +2069,7 @@
           <a:p>
             <a:fld id="{E9BFB732-892F-4075-8F06-FD9E514BB2D2}" type="datetimeFigureOut">
               <a:rPr lang="en-US" smtClean="0"/>
-              <a:t>7/19/2022</a:t>
+              <a:t>7/28/2022</a:t>
             </a:fld>
             <a:endParaRPr lang="en-US"/>
           </a:p>
@@ -2375,7 +2380,7 @@
           <a:p>
             <a:fld id="{E9BFB732-892F-4075-8F06-FD9E514BB2D2}" type="datetimeFigureOut">
               <a:rPr lang="en-US" smtClean="0"/>
-              <a:t>7/19/2022</a:t>
+              <a:t>7/28/2022</a:t>
             </a:fld>
             <a:endParaRPr lang="en-US"/>
           </a:p>
@@ -2663,7 +2668,7 @@
           <a:p>
             <a:fld id="{E9BFB732-892F-4075-8F06-FD9E514BB2D2}" type="datetimeFigureOut">
               <a:rPr lang="en-US" smtClean="0"/>
-              <a:t>7/19/2022</a:t>
+              <a:t>7/28/2022</a:t>
             </a:fld>
             <a:endParaRPr lang="en-US"/>
           </a:p>
@@ -2904,7 +2909,7 @@
           <a:p>
             <a:fld id="{E9BFB732-892F-4075-8F06-FD9E514BB2D2}" type="datetimeFigureOut">
               <a:rPr lang="en-US" smtClean="0"/>
-              <a:t>7/19/2022</a:t>
+              <a:t>7/28/2022</a:t>
             </a:fld>
             <a:endParaRPr lang="en-US"/>
           </a:p>
@@ -3401,13 +3406,13 @@
         </p:nvSpPr>
         <p:spPr>
           <a:xfrm>
-            <a:off x="3917576" y="749249"/>
-            <a:ext cx="1111624" cy="457200"/>
+            <a:off x="3845858" y="749249"/>
+            <a:ext cx="1483232" cy="457200"/>
           </a:xfrm>
           <a:prstGeom prst="wedgeRectCallout">
             <a:avLst>
-              <a:gd name="adj1" fmla="val 429166"/>
-              <a:gd name="adj2" fmla="val 209559"/>
+              <a:gd name="adj1" fmla="val 315538"/>
+              <a:gd name="adj2" fmla="val 213481"/>
             </a:avLst>
           </a:prstGeom>
         </p:spPr>
@@ -3719,13 +3724,13 @@
         </p:nvSpPr>
         <p:spPr>
           <a:xfrm>
-            <a:off x="3917576" y="755972"/>
-            <a:ext cx="1111624" cy="457200"/>
+            <a:off x="3845858" y="755972"/>
+            <a:ext cx="1483232" cy="457200"/>
           </a:xfrm>
           <a:prstGeom prst="wedgeRectCallout">
             <a:avLst>
-              <a:gd name="adj1" fmla="val -106317"/>
-              <a:gd name="adj2" fmla="val 195833"/>
+              <a:gd name="adj1" fmla="val -89559"/>
+              <a:gd name="adj2" fmla="val 197793"/>
             </a:avLst>
           </a:prstGeom>
         </p:spPr>
@@ -3750,7 +3755,7 @@
             <a:pPr algn="ctr"/>
             <a:r>
               <a:rPr lang="es-ES" dirty="0"/>
-              <a:t>C16: 22nF</a:t>
+              <a:t>C16: 2x330pF</a:t>
             </a:r>
             <a:endParaRPr lang="en-US" dirty="0"/>
           </a:p>
@@ -3856,7 +3861,7 @@
             <a:pPr algn="ctr"/>
             <a:r>
               <a:rPr lang="es-ES" dirty="0"/>
-              <a:t>C15: 680nF</a:t>
+              <a:t>C15: 8.2nF</a:t>
             </a:r>
             <a:endParaRPr lang="en-US" dirty="0"/>
           </a:p>
@@ -3962,7 +3967,7 @@
             <a:pPr algn="ctr"/>
             <a:r>
               <a:rPr lang="es-ES" dirty="0"/>
-              <a:t>C14: 47nF</a:t>
+              <a:t>C14: 330pF</a:t>
             </a:r>
             <a:endParaRPr lang="en-US" dirty="0"/>
           </a:p>

</xml_diff>